<commit_message>
Fixed number of slides
</commit_message>
<xml_diff>
--- a/dark/sapienza-ppt-template_dark.pptx
+++ b/dark/sapienza-ppt-template_dark.pptx
@@ -818,7 +818,7 @@
   <p:cSld>
     <p:spTree>
       <p:nvGrpSpPr>
-        <p:cNvPr id="66" name="Shape 66"/>
+        <p:cNvPr id="65" name="Shape 65"/>
         <p:cNvGrpSpPr/>
         <p:nvPr/>
       </p:nvGrpSpPr>
@@ -832,7 +832,7 @@
       </p:grpSpPr>
       <p:sp>
         <p:nvSpPr>
-          <p:cNvPr id="67" name="Google Shape;67;g12df644b60b_0_14:notes"/>
+          <p:cNvPr id="66" name="Google Shape;66;g12df644b60b_0_14:notes"/>
           <p:cNvSpPr/>
           <p:nvPr>
             <p:ph idx="2" type="sldImg"/>
@@ -867,7 +867,7 @@
       </p:sp>
       <p:sp>
         <p:nvSpPr>
-          <p:cNvPr id="68" name="Google Shape;68;g12df644b60b_0_14:notes"/>
+          <p:cNvPr id="67" name="Google Shape;67;g12df644b60b_0_14:notes"/>
           <p:cNvSpPr txBox="1"/>
           <p:nvPr>
             <p:ph idx="1" type="body"/>
@@ -917,7 +917,7 @@
   <p:cSld>
     <p:spTree>
       <p:nvGrpSpPr>
-        <p:cNvPr id="78" name="Shape 78"/>
+        <p:cNvPr id="77" name="Shape 77"/>
         <p:cNvGrpSpPr/>
         <p:nvPr/>
       </p:nvGrpSpPr>
@@ -931,7 +931,7 @@
       </p:grpSpPr>
       <p:sp>
         <p:nvSpPr>
-          <p:cNvPr id="79" name="Google Shape;79;g12ade092b4f_0_5:notes"/>
+          <p:cNvPr id="78" name="Google Shape;78;g12ade092b4f_0_5:notes"/>
           <p:cNvSpPr/>
           <p:nvPr>
             <p:ph idx="2" type="sldImg"/>
@@ -966,7 +966,7 @@
       </p:sp>
       <p:sp>
         <p:nvSpPr>
-          <p:cNvPr id="80" name="Google Shape;80;g12ade092b4f_0_5:notes"/>
+          <p:cNvPr id="79" name="Google Shape;79;g12ade092b4f_0_5:notes"/>
           <p:cNvSpPr txBox="1"/>
           <p:nvPr>
             <p:ph idx="1" type="body"/>
@@ -1019,7 +1019,7 @@
   <p:cSld>
     <p:spTree>
       <p:nvGrpSpPr>
-        <p:cNvPr id="86" name="Shape 86"/>
+        <p:cNvPr id="85" name="Shape 85"/>
         <p:cNvGrpSpPr/>
         <p:nvPr/>
       </p:nvGrpSpPr>
@@ -1033,7 +1033,7 @@
       </p:grpSpPr>
       <p:sp>
         <p:nvSpPr>
-          <p:cNvPr id="87" name="Google Shape;87;g1289395c232_45_41:notes"/>
+          <p:cNvPr id="86" name="Google Shape;86;g1289395c232_45_41:notes"/>
           <p:cNvSpPr/>
           <p:nvPr>
             <p:ph idx="2" type="sldImg"/>
@@ -1068,7 +1068,7 @@
       </p:sp>
       <p:sp>
         <p:nvSpPr>
-          <p:cNvPr id="88" name="Google Shape;88;g1289395c232_45_41:notes"/>
+          <p:cNvPr id="87" name="Google Shape;87;g1289395c232_45_41:notes"/>
           <p:cNvSpPr txBox="1"/>
           <p:nvPr>
             <p:ph idx="1" type="body"/>
@@ -1118,7 +1118,7 @@
   <p:cSld>
     <p:spTree>
       <p:nvGrpSpPr>
-        <p:cNvPr id="98" name="Shape 98"/>
+        <p:cNvPr id="97" name="Shape 97"/>
         <p:cNvGrpSpPr/>
         <p:nvPr/>
       </p:nvGrpSpPr>
@@ -1132,7 +1132,7 @@
       </p:grpSpPr>
       <p:sp>
         <p:nvSpPr>
-          <p:cNvPr id="99" name="Google Shape;99;g12df644b60b_0_98:notes"/>
+          <p:cNvPr id="98" name="Google Shape;98;g12df644b60b_0_98:notes"/>
           <p:cNvSpPr/>
           <p:nvPr>
             <p:ph idx="2" type="sldImg"/>
@@ -1167,7 +1167,7 @@
       </p:sp>
       <p:sp>
         <p:nvSpPr>
-          <p:cNvPr id="100" name="Google Shape;100;g12df644b60b_0_98:notes"/>
+          <p:cNvPr id="99" name="Google Shape;99;g12df644b60b_0_98:notes"/>
           <p:cNvSpPr txBox="1"/>
           <p:nvPr>
             <p:ph idx="1" type="body"/>
@@ -1217,7 +1217,7 @@
   <p:cSld>
     <p:spTree>
       <p:nvGrpSpPr>
-        <p:cNvPr id="107" name="Shape 107"/>
+        <p:cNvPr id="106" name="Shape 106"/>
         <p:cNvGrpSpPr/>
         <p:nvPr/>
       </p:nvGrpSpPr>
@@ -1231,7 +1231,7 @@
       </p:grpSpPr>
       <p:sp>
         <p:nvSpPr>
-          <p:cNvPr id="108" name="Google Shape;108;g12df644b60b_0_108:notes"/>
+          <p:cNvPr id="107" name="Google Shape;107;g12df644b60b_0_108:notes"/>
           <p:cNvSpPr/>
           <p:nvPr>
             <p:ph idx="2" type="sldImg"/>
@@ -1266,7 +1266,7 @@
       </p:sp>
       <p:sp>
         <p:nvSpPr>
-          <p:cNvPr id="109" name="Google Shape;109;g12df644b60b_0_108:notes"/>
+          <p:cNvPr id="108" name="Google Shape;108;g12df644b60b_0_108:notes"/>
           <p:cNvSpPr txBox="1"/>
           <p:nvPr>
             <p:ph idx="1" type="body"/>
@@ -1316,7 +1316,7 @@
   <p:cSld>
     <p:spTree>
       <p:nvGrpSpPr>
-        <p:cNvPr id="124" name="Shape 124"/>
+        <p:cNvPr id="123" name="Shape 123"/>
         <p:cNvGrpSpPr/>
         <p:nvPr/>
       </p:nvGrpSpPr>
@@ -1330,7 +1330,7 @@
       </p:grpSpPr>
       <p:sp>
         <p:nvSpPr>
-          <p:cNvPr id="125" name="Google Shape;125;g12a3e01eb3d_2_0:notes"/>
+          <p:cNvPr id="124" name="Google Shape;124;g12a3e01eb3d_2_0:notes"/>
           <p:cNvSpPr/>
           <p:nvPr>
             <p:ph idx="2" type="sldImg"/>
@@ -1365,7 +1365,7 @@
       </p:sp>
       <p:sp>
         <p:nvSpPr>
-          <p:cNvPr id="126" name="Google Shape;126;g12a3e01eb3d_2_0:notes"/>
+          <p:cNvPr id="125" name="Google Shape;125;g12a3e01eb3d_2_0:notes"/>
           <p:cNvSpPr txBox="1"/>
           <p:nvPr>
             <p:ph idx="1" type="body"/>
@@ -1415,7 +1415,7 @@
   <p:cSld>
     <p:spTree>
       <p:nvGrpSpPr>
-        <p:cNvPr id="132" name="Shape 132"/>
+        <p:cNvPr id="131" name="Shape 131"/>
         <p:cNvGrpSpPr/>
         <p:nvPr/>
       </p:nvGrpSpPr>
@@ -1429,7 +1429,7 @@
       </p:grpSpPr>
       <p:sp>
         <p:nvSpPr>
-          <p:cNvPr id="133" name="Google Shape;133;g95670f63ae_0_316:notes"/>
+          <p:cNvPr id="132" name="Google Shape;132;g95670f63ae_0_316:notes"/>
           <p:cNvSpPr/>
           <p:nvPr>
             <p:ph idx="2" type="sldImg"/>
@@ -1464,7 +1464,7 @@
       </p:sp>
       <p:sp>
         <p:nvSpPr>
-          <p:cNvPr id="134" name="Google Shape;134;g95670f63ae_0_316:notes"/>
+          <p:cNvPr id="133" name="Google Shape;133;g95670f63ae_0_316:notes"/>
           <p:cNvSpPr txBox="1"/>
           <p:nvPr>
             <p:ph idx="1" type="body"/>
@@ -1548,7 +1548,7 @@
             <a:avLst/>
           </a:prstGeom>
           <a:solidFill>
-            <a:schemeClr val="lt1"/>
+            <a:schemeClr val="accent1"/>
           </a:solidFill>
           <a:ln>
             <a:noFill/>
@@ -2159,7 +2159,7 @@
             <a:avLst/>
           </a:prstGeom>
           <a:solidFill>
-            <a:schemeClr val="lt1"/>
+            <a:schemeClr val="accent1"/>
           </a:solidFill>
           <a:ln>
             <a:noFill/>
@@ -3337,7 +3337,7 @@
             <a:avLst/>
           </a:prstGeom>
           <a:solidFill>
-            <a:schemeClr val="lt2"/>
+            <a:schemeClr val="accent1"/>
           </a:solidFill>
           <a:ln>
             <a:noFill/>
@@ -5498,7 +5498,7 @@
               <a:buNone/>
               <a:defRPr sz="1000">
                 <a:solidFill>
-                  <a:schemeClr val="accent1"/>
+                  <a:schemeClr val="lt2"/>
                 </a:solidFill>
                 <a:latin typeface="Catamaran"/>
                 <a:ea typeface="Catamaran"/>
@@ -5510,7 +5510,7 @@
               <a:buNone/>
               <a:defRPr sz="1000">
                 <a:solidFill>
-                  <a:schemeClr val="accent1"/>
+                  <a:schemeClr val="lt2"/>
                 </a:solidFill>
                 <a:latin typeface="Catamaran"/>
                 <a:ea typeface="Catamaran"/>
@@ -5522,7 +5522,7 @@
               <a:buNone/>
               <a:defRPr sz="1000">
                 <a:solidFill>
-                  <a:schemeClr val="accent1"/>
+                  <a:schemeClr val="lt2"/>
                 </a:solidFill>
                 <a:latin typeface="Catamaran"/>
                 <a:ea typeface="Catamaran"/>
@@ -5534,7 +5534,7 @@
               <a:buNone/>
               <a:defRPr sz="1000">
                 <a:solidFill>
-                  <a:schemeClr val="accent1"/>
+                  <a:schemeClr val="lt2"/>
                 </a:solidFill>
                 <a:latin typeface="Catamaran"/>
                 <a:ea typeface="Catamaran"/>
@@ -5546,7 +5546,7 @@
               <a:buNone/>
               <a:defRPr sz="1000">
                 <a:solidFill>
-                  <a:schemeClr val="accent1"/>
+                  <a:schemeClr val="lt2"/>
                 </a:solidFill>
                 <a:latin typeface="Catamaran"/>
                 <a:ea typeface="Catamaran"/>
@@ -5558,7 +5558,7 @@
               <a:buNone/>
               <a:defRPr sz="1000">
                 <a:solidFill>
-                  <a:schemeClr val="accent1"/>
+                  <a:schemeClr val="lt2"/>
                 </a:solidFill>
                 <a:latin typeface="Catamaran"/>
                 <a:ea typeface="Catamaran"/>
@@ -5570,7 +5570,7 @@
               <a:buNone/>
               <a:defRPr sz="1000">
                 <a:solidFill>
-                  <a:schemeClr val="accent1"/>
+                  <a:schemeClr val="lt2"/>
                 </a:solidFill>
                 <a:latin typeface="Catamaran"/>
                 <a:ea typeface="Catamaran"/>
@@ -5582,7 +5582,7 @@
               <a:buNone/>
               <a:defRPr sz="1000">
                 <a:solidFill>
-                  <a:schemeClr val="accent1"/>
+                  <a:schemeClr val="lt2"/>
                 </a:solidFill>
                 <a:latin typeface="Catamaran"/>
                 <a:ea typeface="Catamaran"/>
@@ -5594,7 +5594,7 @@
               <a:buNone/>
               <a:defRPr sz="1000">
                 <a:solidFill>
-                  <a:schemeClr val="accent1"/>
+                  <a:schemeClr val="lt2"/>
                 </a:solidFill>
                 <a:latin typeface="Catamaran"/>
                 <a:ea typeface="Catamaran"/>
@@ -6452,46 +6452,6 @@
           </a:p>
         </p:txBody>
       </p:sp>
-      <p:sp>
-        <p:nvSpPr>
-          <p:cNvPr id="65" name="Google Shape;65;p6"/>
-          <p:cNvSpPr txBox="1"/>
-          <p:nvPr>
-            <p:ph idx="12" type="sldNum"/>
-          </p:nvPr>
-        </p:nvSpPr>
-        <p:spPr>
-          <a:xfrm>
-            <a:off x="8536302" y="4749851"/>
-            <a:ext cx="548700" cy="393600"/>
-          </a:xfrm>
-          <a:prstGeom prst="rect">
-            <a:avLst/>
-          </a:prstGeom>
-        </p:spPr>
-        <p:txBody>
-          <a:bodyPr anchorCtr="0" anchor="ctr" bIns="91425" lIns="91425" spcFirstLastPara="1" rIns="91425" wrap="square" tIns="91425">
-            <a:noAutofit/>
-          </a:bodyPr>
-          <a:lstStyle/>
-          <a:p>
-            <a:pPr indent="0" lvl="0" marL="0" rtl="0" algn="r">
-              <a:spcBef>
-                <a:spcPts val="0"/>
-              </a:spcBef>
-              <a:spcAft>
-                <a:spcPts val="0"/>
-              </a:spcAft>
-              <a:buNone/>
-            </a:pPr>
-            <a:fld id="{00000000-1234-1234-1234-123412341234}" type="slidenum">
-              <a:rPr lang="it"/>
-              <a:t>‹#›</a:t>
-            </a:fld>
-            <a:endParaRPr/>
-          </a:p>
-        </p:txBody>
-      </p:sp>
     </p:spTree>
   </p:cSld>
   <p:clrMapOvr>
@@ -6505,7 +6465,7 @@
   <p:cSld>
     <p:spTree>
       <p:nvGrpSpPr>
-        <p:cNvPr id="69" name="Shape 69"/>
+        <p:cNvPr id="68" name="Shape 68"/>
         <p:cNvGrpSpPr/>
         <p:nvPr/>
       </p:nvGrpSpPr>
@@ -6519,7 +6479,7 @@
       </p:grpSpPr>
       <p:sp>
         <p:nvSpPr>
-          <p:cNvPr id="70" name="Google Shape;70;p7"/>
+          <p:cNvPr id="69" name="Google Shape;69;p7"/>
           <p:cNvSpPr txBox="1"/>
           <p:nvPr>
             <p:ph idx="12" type="sldNum"/>
@@ -6559,7 +6519,7 @@
       </p:sp>
       <p:sp>
         <p:nvSpPr>
-          <p:cNvPr id="71" name="Google Shape;71;p7"/>
+          <p:cNvPr id="70" name="Google Shape;70;p7"/>
           <p:cNvSpPr txBox="1"/>
           <p:nvPr>
             <p:ph type="title"/>
@@ -6599,7 +6559,7 @@
       </p:sp>
       <p:sp>
         <p:nvSpPr>
-          <p:cNvPr id="72" name="Google Shape;72;p7"/>
+          <p:cNvPr id="71" name="Google Shape;71;p7"/>
           <p:cNvSpPr txBox="1"/>
           <p:nvPr/>
         </p:nvSpPr>
@@ -6657,7 +6617,7 @@
       </p:sp>
       <p:sp>
         <p:nvSpPr>
-          <p:cNvPr id="73" name="Google Shape;73;p7"/>
+          <p:cNvPr id="72" name="Google Shape;72;p7"/>
           <p:cNvSpPr txBox="1"/>
           <p:nvPr/>
         </p:nvSpPr>
@@ -6715,7 +6675,7 @@
       </p:sp>
       <p:sp>
         <p:nvSpPr>
-          <p:cNvPr id="74" name="Google Shape;74;p7"/>
+          <p:cNvPr id="73" name="Google Shape;73;p7"/>
           <p:cNvSpPr txBox="1"/>
           <p:nvPr/>
         </p:nvSpPr>
@@ -6773,7 +6733,7 @@
       </p:sp>
       <p:sp>
         <p:nvSpPr>
-          <p:cNvPr id="75" name="Google Shape;75;p7"/>
+          <p:cNvPr id="74" name="Google Shape;74;p7"/>
           <p:cNvSpPr txBox="1"/>
           <p:nvPr/>
         </p:nvSpPr>
@@ -6831,7 +6791,7 @@
       </p:sp>
       <p:sp>
         <p:nvSpPr>
-          <p:cNvPr id="76" name="Google Shape;76;p7"/>
+          <p:cNvPr id="75" name="Google Shape;75;p7"/>
           <p:cNvSpPr txBox="1"/>
           <p:nvPr/>
         </p:nvSpPr>
@@ -6889,7 +6849,7 @@
       </p:sp>
       <p:sp>
         <p:nvSpPr>
-          <p:cNvPr id="77" name="Google Shape;77;p7"/>
+          <p:cNvPr id="76" name="Google Shape;76;p7"/>
           <p:cNvSpPr txBox="1"/>
           <p:nvPr/>
         </p:nvSpPr>
@@ -6958,7 +6918,7 @@
   <p:cSld>
     <p:spTree>
       <p:nvGrpSpPr>
-        <p:cNvPr id="81" name="Shape 81"/>
+        <p:cNvPr id="80" name="Shape 80"/>
         <p:cNvGrpSpPr/>
         <p:nvPr/>
       </p:nvGrpSpPr>
@@ -6972,7 +6932,7 @@
       </p:grpSpPr>
       <p:sp>
         <p:nvSpPr>
-          <p:cNvPr id="82" name="Google Shape;82;p8"/>
+          <p:cNvPr id="81" name="Google Shape;81;p8"/>
           <p:cNvSpPr txBox="1"/>
           <p:nvPr>
             <p:ph type="title"/>
@@ -7012,7 +6972,7 @@
       </p:sp>
       <p:sp>
         <p:nvSpPr>
-          <p:cNvPr id="83" name="Google Shape;83;p8"/>
+          <p:cNvPr id="82" name="Google Shape;82;p8"/>
           <p:cNvSpPr txBox="1"/>
           <p:nvPr>
             <p:ph idx="1" type="body"/>
@@ -7044,7 +7004,7 @@
             </a:pPr>
             <a:r>
               <a:rPr lang="it"/>
-              <a:t>Lorem ipsum dolor sit amet, consectetur adipisci elit, sed eiusmod tempor incidunt ut labore et dolore magna aliqua. Ut enim ad minim veniam, quis nostrum exercitationem ullam corporis suscipit laboriosam, nisi ut aliquid ex ea commodi consequatur. Quis aute iure reprehenderit in voluptate velit esse cillum dolore eu fugiat nulla pariatur. Excepteur sint obcaecat cupiditat non proident, sunt in culpa qui officia deserunt mollit anim id est laborum.</a:t>
+              <a:t>Lorem ipsum dolor sit amet, consectetur adipisci elit, sed eiusmod tempor incidunt ut labore et dolore magna aliqua. Ut enim ad minim veniam, quis nostrum exercitationem ullam corporis suscipit laboriosam, nisi ut aliquid ex ea commodi consequatur. Quis aute iure reprehenderit in voluptate velit esse cillum dolore eu fugiat nulla pariatur. Excepteur sint obcaecat cupiditat non proident, sunt in culpa qui officia deserunt mollit anim id est laborum. </a:t>
             </a:r>
             <a:endParaRPr/>
           </a:p>
@@ -7052,7 +7012,7 @@
       </p:sp>
       <p:sp>
         <p:nvSpPr>
-          <p:cNvPr id="84" name="Google Shape;84;p8"/>
+          <p:cNvPr id="83" name="Google Shape;83;p8"/>
           <p:cNvSpPr txBox="1"/>
           <p:nvPr>
             <p:ph idx="12" type="sldNum"/>
@@ -7092,7 +7052,7 @@
       </p:sp>
       <p:sp>
         <p:nvSpPr>
-          <p:cNvPr id="85" name="Google Shape;85;p8"/>
+          <p:cNvPr id="84" name="Google Shape;84;p8"/>
           <p:cNvSpPr txBox="1"/>
           <p:nvPr>
             <p:ph idx="2" type="subTitle"/>
@@ -7143,7 +7103,7 @@
   <p:cSld>
     <p:spTree>
       <p:nvGrpSpPr>
-        <p:cNvPr id="89" name="Shape 89"/>
+        <p:cNvPr id="88" name="Shape 88"/>
         <p:cNvGrpSpPr/>
         <p:nvPr/>
       </p:nvGrpSpPr>
@@ -7157,7 +7117,7 @@
       </p:grpSpPr>
       <p:sp>
         <p:nvSpPr>
-          <p:cNvPr id="90" name="Google Shape;90;p9"/>
+          <p:cNvPr id="89" name="Google Shape;89;p9"/>
           <p:cNvSpPr txBox="1"/>
           <p:nvPr>
             <p:ph type="title"/>
@@ -7197,7 +7157,7 @@
       </p:sp>
       <p:sp>
         <p:nvSpPr>
-          <p:cNvPr id="91" name="Google Shape;91;p9"/>
+          <p:cNvPr id="90" name="Google Shape;90;p9"/>
           <p:cNvSpPr txBox="1"/>
           <p:nvPr>
             <p:ph idx="12" type="sldNum"/>
@@ -7237,7 +7197,7 @@
       </p:sp>
       <p:sp>
         <p:nvSpPr>
-          <p:cNvPr id="92" name="Google Shape;92;p9"/>
+          <p:cNvPr id="91" name="Google Shape;91;p9"/>
           <p:cNvSpPr txBox="1"/>
           <p:nvPr>
             <p:ph idx="1" type="body"/>
@@ -7277,7 +7237,7 @@
       </p:sp>
       <p:sp>
         <p:nvSpPr>
-          <p:cNvPr id="93" name="Google Shape;93;p9"/>
+          <p:cNvPr id="92" name="Google Shape;92;p9"/>
           <p:cNvSpPr/>
           <p:nvPr/>
         </p:nvSpPr>
@@ -7296,9 +7256,9 @@
               <a:alpha val="30050"/>
             </a:srgbClr>
           </a:solidFill>
-          <a:ln cap="flat" cmpd="sng" w="9525">
+          <a:ln cap="flat" cmpd="sng" w="19050">
             <a:solidFill>
-              <a:schemeClr val="dk2"/>
+              <a:srgbClr val="6F0A19"/>
             </a:solidFill>
             <a:prstDash val="solid"/>
             <a:round/>
@@ -7346,7 +7306,7 @@
       </p:sp>
       <p:sp>
         <p:nvSpPr>
-          <p:cNvPr id="94" name="Google Shape;94;p9"/>
+          <p:cNvPr id="93" name="Google Shape;93;p9"/>
           <p:cNvSpPr/>
           <p:nvPr/>
         </p:nvSpPr>
@@ -7365,9 +7325,9 @@
               <a:alpha val="44260"/>
             </a:srgbClr>
           </a:solidFill>
-          <a:ln cap="flat" cmpd="sng" w="9525">
+          <a:ln cap="flat" cmpd="sng" w="19050">
             <a:solidFill>
-              <a:schemeClr val="dk2"/>
+              <a:srgbClr val="006778"/>
             </a:solidFill>
             <a:prstDash val="solid"/>
             <a:round/>
@@ -7415,7 +7375,7 @@
       </p:sp>
       <p:sp>
         <p:nvSpPr>
-          <p:cNvPr id="95" name="Google Shape;95;p9"/>
+          <p:cNvPr id="94" name="Google Shape;94;p9"/>
           <p:cNvSpPr/>
           <p:nvPr/>
         </p:nvSpPr>
@@ -7432,7 +7392,7 @@
           <a:solidFill>
             <a:srgbClr val="353535"/>
           </a:solidFill>
-          <a:ln cap="flat" cmpd="sng" w="9525">
+          <a:ln cap="flat" cmpd="sng" w="19050">
             <a:solidFill>
               <a:srgbClr val="6F0A19"/>
             </a:solidFill>
@@ -7483,7 +7443,7 @@
       </p:sp>
       <p:sp>
         <p:nvSpPr>
-          <p:cNvPr id="96" name="Google Shape;96;p9"/>
+          <p:cNvPr id="95" name="Google Shape;95;p9"/>
           <p:cNvSpPr/>
           <p:nvPr/>
         </p:nvSpPr>
@@ -7500,7 +7460,7 @@
           <a:solidFill>
             <a:srgbClr val="353535"/>
           </a:solidFill>
-          <a:ln cap="flat" cmpd="sng" w="9525">
+          <a:ln cap="flat" cmpd="sng" w="19050">
             <a:solidFill>
               <a:srgbClr val="006778"/>
             </a:solidFill>
@@ -7551,7 +7511,7 @@
       </p:sp>
       <p:sp>
         <p:nvSpPr>
-          <p:cNvPr id="97" name="Google Shape;97;p9"/>
+          <p:cNvPr id="96" name="Google Shape;96;p9"/>
           <p:cNvSpPr txBox="1"/>
           <p:nvPr>
             <p:ph idx="2" type="subTitle"/>
@@ -7602,7 +7562,7 @@
   <p:cSld>
     <p:spTree>
       <p:nvGrpSpPr>
-        <p:cNvPr id="101" name="Shape 101"/>
+        <p:cNvPr id="100" name="Shape 100"/>
         <p:cNvGrpSpPr/>
         <p:nvPr/>
       </p:nvGrpSpPr>
@@ -7616,7 +7576,7 @@
       </p:grpSpPr>
       <p:sp>
         <p:nvSpPr>
-          <p:cNvPr id="102" name="Google Shape;102;p10"/>
+          <p:cNvPr id="101" name="Google Shape;101;p10"/>
           <p:cNvSpPr txBox="1"/>
           <p:nvPr>
             <p:ph type="title"/>
@@ -7656,7 +7616,7 @@
       </p:sp>
       <p:sp>
         <p:nvSpPr>
-          <p:cNvPr id="103" name="Google Shape;103;p10"/>
+          <p:cNvPr id="102" name="Google Shape;102;p10"/>
           <p:cNvSpPr txBox="1"/>
           <p:nvPr>
             <p:ph idx="1" type="subTitle"/>
@@ -7696,7 +7656,7 @@
       </p:sp>
       <p:sp>
         <p:nvSpPr>
-          <p:cNvPr id="104" name="Google Shape;104;p10"/>
+          <p:cNvPr id="103" name="Google Shape;103;p10"/>
           <p:cNvSpPr txBox="1"/>
           <p:nvPr>
             <p:ph idx="2" type="body"/>
@@ -7736,7 +7696,7 @@
       </p:sp>
       <p:sp>
         <p:nvSpPr>
-          <p:cNvPr id="105" name="Google Shape;105;p10"/>
+          <p:cNvPr id="104" name="Google Shape;104;p10"/>
           <p:cNvSpPr txBox="1"/>
           <p:nvPr>
             <p:ph idx="12" type="sldNum"/>
@@ -7776,7 +7736,7 @@
       </p:sp>
       <p:sp>
         <p:nvSpPr>
-          <p:cNvPr id="106" name="Google Shape;106;p10"/>
+          <p:cNvPr id="105" name="Google Shape;105;p10"/>
           <p:cNvSpPr txBox="1"/>
           <p:nvPr>
             <p:ph idx="3" type="subTitle"/>
@@ -7827,7 +7787,7 @@
   <p:cSld>
     <p:spTree>
       <p:nvGrpSpPr>
-        <p:cNvPr id="110" name="Shape 110"/>
+        <p:cNvPr id="109" name="Shape 109"/>
         <p:cNvGrpSpPr/>
         <p:nvPr/>
       </p:nvGrpSpPr>
@@ -7841,7 +7801,7 @@
       </p:grpSpPr>
       <p:sp>
         <p:nvSpPr>
-          <p:cNvPr id="111" name="Google Shape;111;p11"/>
+          <p:cNvPr id="110" name="Google Shape;110;p11"/>
           <p:cNvSpPr txBox="1"/>
           <p:nvPr>
             <p:ph idx="12" type="sldNum"/>
@@ -7881,7 +7841,7 @@
       </p:sp>
       <p:sp>
         <p:nvSpPr>
-          <p:cNvPr id="112" name="Google Shape;112;p11"/>
+          <p:cNvPr id="111" name="Google Shape;111;p11"/>
           <p:cNvSpPr txBox="1"/>
           <p:nvPr>
             <p:ph idx="2" type="subTitle"/>
@@ -7921,7 +7881,7 @@
       </p:sp>
       <p:sp>
         <p:nvSpPr>
-          <p:cNvPr id="113" name="Google Shape;113;p11"/>
+          <p:cNvPr id="112" name="Google Shape;112;p11"/>
           <p:cNvSpPr txBox="1"/>
           <p:nvPr/>
         </p:nvSpPr>
@@ -7979,7 +7939,7 @@
       </p:sp>
       <p:sp>
         <p:nvSpPr>
-          <p:cNvPr id="114" name="Google Shape;114;p11"/>
+          <p:cNvPr id="113" name="Google Shape;113;p11"/>
           <p:cNvSpPr txBox="1"/>
           <p:nvPr/>
         </p:nvSpPr>
@@ -8037,7 +7997,7 @@
       </p:sp>
       <p:sp>
         <p:nvSpPr>
-          <p:cNvPr id="115" name="Google Shape;115;p11"/>
+          <p:cNvPr id="114" name="Google Shape;114;p11"/>
           <p:cNvSpPr txBox="1"/>
           <p:nvPr/>
         </p:nvSpPr>
@@ -8095,7 +8055,7 @@
       </p:sp>
       <p:sp>
         <p:nvSpPr>
-          <p:cNvPr id="116" name="Google Shape;116;p11"/>
+          <p:cNvPr id="115" name="Google Shape;115;p11"/>
           <p:cNvSpPr txBox="1"/>
           <p:nvPr/>
         </p:nvSpPr>
@@ -8176,7 +8136,7 @@
       </p:sp>
       <p:sp>
         <p:nvSpPr>
-          <p:cNvPr id="117" name="Google Shape;117;p11"/>
+          <p:cNvPr id="116" name="Google Shape;116;p11"/>
           <p:cNvSpPr txBox="1"/>
           <p:nvPr/>
         </p:nvSpPr>
@@ -8234,7 +8194,7 @@
       </p:sp>
       <p:sp>
         <p:nvSpPr>
-          <p:cNvPr id="118" name="Google Shape;118;p11"/>
+          <p:cNvPr id="117" name="Google Shape;117;p11"/>
           <p:cNvSpPr txBox="1"/>
           <p:nvPr/>
         </p:nvSpPr>
@@ -8292,7 +8252,7 @@
       </p:sp>
       <p:sp>
         <p:nvSpPr>
-          <p:cNvPr id="119" name="Google Shape;119;p11"/>
+          <p:cNvPr id="118" name="Google Shape;118;p11"/>
           <p:cNvSpPr txBox="1"/>
           <p:nvPr/>
         </p:nvSpPr>
@@ -8350,7 +8310,7 @@
       </p:sp>
       <p:sp>
         <p:nvSpPr>
-          <p:cNvPr id="120" name="Google Shape;120;p11"/>
+          <p:cNvPr id="119" name="Google Shape;119;p11"/>
           <p:cNvSpPr/>
           <p:nvPr/>
         </p:nvSpPr>
@@ -8363,7 +8323,7 @@
             <a:avLst/>
           </a:prstGeom>
           <a:solidFill>
-            <a:schemeClr val="lt2"/>
+            <a:srgbClr val="595959"/>
           </a:solidFill>
           <a:ln>
             <a:noFill/>
@@ -8393,7 +8353,7 @@
       </p:sp>
       <p:sp>
         <p:nvSpPr>
-          <p:cNvPr id="121" name="Google Shape;121;p11"/>
+          <p:cNvPr id="120" name="Google Shape;120;p11"/>
           <p:cNvSpPr/>
           <p:nvPr/>
         </p:nvSpPr>
@@ -8440,7 +8400,7 @@
       </p:sp>
       <p:sp>
         <p:nvSpPr>
-          <p:cNvPr id="122" name="Google Shape;122;p11"/>
+          <p:cNvPr id="121" name="Google Shape;121;p11"/>
           <p:cNvSpPr/>
           <p:nvPr/>
         </p:nvSpPr>
@@ -8487,7 +8447,7 @@
       </p:sp>
       <p:sp>
         <p:nvSpPr>
-          <p:cNvPr id="123" name="Google Shape;123;p11"/>
+          <p:cNvPr id="122" name="Google Shape;122;p11"/>
           <p:cNvSpPr/>
           <p:nvPr/>
         </p:nvSpPr>
@@ -8545,7 +8505,7 @@
   <p:cSld>
     <p:spTree>
       <p:nvGrpSpPr>
-        <p:cNvPr id="127" name="Shape 127"/>
+        <p:cNvPr id="126" name="Shape 126"/>
         <p:cNvGrpSpPr/>
         <p:nvPr/>
       </p:nvGrpSpPr>
@@ -8559,7 +8519,7 @@
       </p:grpSpPr>
       <p:sp>
         <p:nvSpPr>
-          <p:cNvPr id="128" name="Google Shape;128;p12"/>
+          <p:cNvPr id="127" name="Google Shape;127;p12"/>
           <p:cNvSpPr txBox="1"/>
           <p:nvPr>
             <p:ph type="title"/>
@@ -8599,7 +8559,7 @@
       </p:sp>
       <p:sp>
         <p:nvSpPr>
-          <p:cNvPr id="129" name="Google Shape;129;p12"/>
+          <p:cNvPr id="128" name="Google Shape;128;p12"/>
           <p:cNvSpPr txBox="1"/>
           <p:nvPr>
             <p:ph idx="1" type="body"/>
@@ -8753,7 +8713,7 @@
       </p:sp>
       <p:sp>
         <p:nvSpPr>
-          <p:cNvPr id="130" name="Google Shape;130;p12"/>
+          <p:cNvPr id="129" name="Google Shape;129;p12"/>
           <p:cNvSpPr txBox="1"/>
           <p:nvPr>
             <p:ph idx="12" type="sldNum"/>
@@ -8793,7 +8753,7 @@
       </p:sp>
       <p:sp>
         <p:nvSpPr>
-          <p:cNvPr id="131" name="Google Shape;131;p12"/>
+          <p:cNvPr id="130" name="Google Shape;130;p12"/>
           <p:cNvSpPr txBox="1"/>
           <p:nvPr>
             <p:ph idx="2" type="subTitle"/>
@@ -8844,7 +8804,7 @@
   <p:cSld>
     <p:spTree>
       <p:nvGrpSpPr>
-        <p:cNvPr id="135" name="Shape 135"/>
+        <p:cNvPr id="134" name="Shape 134"/>
         <p:cNvGrpSpPr/>
         <p:nvPr/>
       </p:nvGrpSpPr>
@@ -8858,7 +8818,7 @@
       </p:grpSpPr>
       <p:sp>
         <p:nvSpPr>
-          <p:cNvPr id="136" name="Google Shape;136;p13"/>
+          <p:cNvPr id="135" name="Google Shape;135;p13"/>
           <p:cNvSpPr txBox="1"/>
           <p:nvPr>
             <p:ph type="ctrTitle"/>
@@ -8892,46 +8852,6 @@
               <a:rPr lang="it"/>
               <a:t>Thank you for the attention!</a:t>
             </a:r>
-            <a:endParaRPr/>
-          </a:p>
-        </p:txBody>
-      </p:sp>
-      <p:sp>
-        <p:nvSpPr>
-          <p:cNvPr id="137" name="Google Shape;137;p13"/>
-          <p:cNvSpPr txBox="1"/>
-          <p:nvPr>
-            <p:ph idx="12" type="sldNum"/>
-          </p:nvPr>
-        </p:nvSpPr>
-        <p:spPr>
-          <a:xfrm>
-            <a:off x="8536302" y="4749851"/>
-            <a:ext cx="548700" cy="393600"/>
-          </a:xfrm>
-          <a:prstGeom prst="rect">
-            <a:avLst/>
-          </a:prstGeom>
-        </p:spPr>
-        <p:txBody>
-          <a:bodyPr anchorCtr="0" anchor="ctr" bIns="91425" lIns="91425" spcFirstLastPara="1" rIns="91425" wrap="square" tIns="91425">
-            <a:noAutofit/>
-          </a:bodyPr>
-          <a:lstStyle/>
-          <a:p>
-            <a:pPr indent="0" lvl="0" marL="0" rtl="0" algn="r">
-              <a:spcBef>
-                <a:spcPts val="0"/>
-              </a:spcBef>
-              <a:spcAft>
-                <a:spcPts val="0"/>
-              </a:spcAft>
-              <a:buNone/>
-            </a:pPr>
-            <a:fld id="{00000000-1234-1234-1234-123412341234}" type="slidenum">
-              <a:rPr lang="it"/>
-              <a:t>‹#›</a:t>
-            </a:fld>
             <a:endParaRPr/>
           </a:p>
         </p:txBody>
@@ -8979,7 +8899,7 @@
         <a:srgbClr val="FFB8A2"/>
       </a:accent6>
       <a:hlink>
-        <a:srgbClr val="1C3678"/>
+        <a:srgbClr val="00FFFF"/>
       </a:hlink>
       <a:folHlink>
         <a:srgbClr val="1C3678"/>

</xml_diff>